<commit_message>
Changes in Notebook and notes
</commit_message>
<xml_diff>
--- a/Angelica Landazabal - PyConCo2020.pptx
+++ b/Angelica Landazabal - PyConCo2020.pptx
@@ -333,7 +333,7 @@
             <a:fld id="{5858ED9B-BE88-4148-BE32-6CCB0FE6727E}" type="datetimeFigureOut">
               <a:rPr lang="da-DK" smtClean="0"/>
               <a:pPr/>
-              <a:t>08-02-2020</a:t>
+              <a:t>09-02-2020</a:t>
             </a:fld>
             <a:endParaRPr lang="da-DK"/>
           </a:p>
@@ -505,7 +505,7 @@
             <a:fld id="{5858ED9B-BE88-4148-BE32-6CCB0FE6727E}" type="datetimeFigureOut">
               <a:rPr lang="da-DK" smtClean="0"/>
               <a:pPr/>
-              <a:t>08-02-2020</a:t>
+              <a:t>09-02-2020</a:t>
             </a:fld>
             <a:endParaRPr lang="da-DK"/>
           </a:p>
@@ -687,7 +687,7 @@
             <a:fld id="{5858ED9B-BE88-4148-BE32-6CCB0FE6727E}" type="datetimeFigureOut">
               <a:rPr lang="da-DK" smtClean="0"/>
               <a:pPr/>
-              <a:t>08-02-2020</a:t>
+              <a:t>09-02-2020</a:t>
             </a:fld>
             <a:endParaRPr lang="da-DK"/>
           </a:p>
@@ -859,7 +859,7 @@
             <a:fld id="{5858ED9B-BE88-4148-BE32-6CCB0FE6727E}" type="datetimeFigureOut">
               <a:rPr lang="da-DK" smtClean="0"/>
               <a:pPr/>
-              <a:t>08-02-2020</a:t>
+              <a:t>09-02-2020</a:t>
             </a:fld>
             <a:endParaRPr lang="da-DK"/>
           </a:p>
@@ -1107,7 +1107,7 @@
             <a:fld id="{5858ED9B-BE88-4148-BE32-6CCB0FE6727E}" type="datetimeFigureOut">
               <a:rPr lang="da-DK" smtClean="0"/>
               <a:pPr/>
-              <a:t>08-02-2020</a:t>
+              <a:t>09-02-2020</a:t>
             </a:fld>
             <a:endParaRPr lang="da-DK"/>
           </a:p>
@@ -1397,7 +1397,7 @@
             <a:fld id="{5858ED9B-BE88-4148-BE32-6CCB0FE6727E}" type="datetimeFigureOut">
               <a:rPr lang="da-DK" smtClean="0"/>
               <a:pPr/>
-              <a:t>08-02-2020</a:t>
+              <a:t>09-02-2020</a:t>
             </a:fld>
             <a:endParaRPr lang="da-DK"/>
           </a:p>
@@ -1821,7 +1821,7 @@
             <a:fld id="{5858ED9B-BE88-4148-BE32-6CCB0FE6727E}" type="datetimeFigureOut">
               <a:rPr lang="da-DK" smtClean="0"/>
               <a:pPr/>
-              <a:t>08-02-2020</a:t>
+              <a:t>09-02-2020</a:t>
             </a:fld>
             <a:endParaRPr lang="da-DK"/>
           </a:p>
@@ -1941,7 +1941,7 @@
             <a:fld id="{5858ED9B-BE88-4148-BE32-6CCB0FE6727E}" type="datetimeFigureOut">
               <a:rPr lang="da-DK" smtClean="0"/>
               <a:pPr/>
-              <a:t>08-02-2020</a:t>
+              <a:t>09-02-2020</a:t>
             </a:fld>
             <a:endParaRPr lang="da-DK"/>
           </a:p>
@@ -2038,7 +2038,7 @@
             <a:fld id="{5858ED9B-BE88-4148-BE32-6CCB0FE6727E}" type="datetimeFigureOut">
               <a:rPr lang="da-DK" smtClean="0"/>
               <a:pPr/>
-              <a:t>08-02-2020</a:t>
+              <a:t>09-02-2020</a:t>
             </a:fld>
             <a:endParaRPr lang="da-DK"/>
           </a:p>
@@ -2317,7 +2317,7 @@
             <a:fld id="{5858ED9B-BE88-4148-BE32-6CCB0FE6727E}" type="datetimeFigureOut">
               <a:rPr lang="da-DK" smtClean="0"/>
               <a:pPr/>
-              <a:t>08-02-2020</a:t>
+              <a:t>09-02-2020</a:t>
             </a:fld>
             <a:endParaRPr lang="da-DK"/>
           </a:p>
@@ -2572,7 +2572,7 @@
             <a:fld id="{5858ED9B-BE88-4148-BE32-6CCB0FE6727E}" type="datetimeFigureOut">
               <a:rPr lang="da-DK" smtClean="0"/>
               <a:pPr/>
-              <a:t>08-02-2020</a:t>
+              <a:t>09-02-2020</a:t>
             </a:fld>
             <a:endParaRPr lang="da-DK"/>
           </a:p>
@@ -2787,7 +2787,7 @@
             <a:fld id="{5858ED9B-BE88-4148-BE32-6CCB0FE6727E}" type="datetimeFigureOut">
               <a:rPr lang="da-DK" smtClean="0"/>
               <a:pPr/>
-              <a:t>08-02-2020</a:t>
+              <a:t>09-02-2020</a:t>
             </a:fld>
             <a:endParaRPr lang="da-DK"/>
           </a:p>
@@ -3886,7 +3886,7 @@
         <p:spPr>
           <a:xfrm>
             <a:off x="457200" y="2244005"/>
-            <a:ext cx="8229600" cy="4065315"/>
+            <a:ext cx="5626968" cy="4065315"/>
           </a:xfrm>
         </p:spPr>
         <p:txBody>
@@ -3969,7 +3969,7 @@
         </p:blipFill>
         <p:spPr bwMode="auto">
           <a:xfrm>
-            <a:off x="6732240" y="4653136"/>
+            <a:off x="6660232" y="4005064"/>
             <a:ext cx="1385721" cy="1124744"/>
           </a:xfrm>
           <a:prstGeom prst="rect">
@@ -4038,35 +4038,6 @@
           </a:p>
         </p:txBody>
       </p:sp>
-      <p:pic>
-        <p:nvPicPr>
-          <p:cNvPr id="7" name="Billede 6" descr="WhatsApp Image 2020-01-27 at 18.59.44.jpeg"/>
-          <p:cNvPicPr>
-            <a:picLocks noChangeAspect="1"/>
-          </p:cNvPicPr>
-          <p:nvPr/>
-        </p:nvPicPr>
-        <p:blipFill>
-          <a:blip r:embed="rId3" cstate="print"/>
-          <a:stretch>
-            <a:fillRect/>
-          </a:stretch>
-        </p:blipFill>
-        <p:spPr>
-          <a:xfrm>
-            <a:off x="1115616" y="4281044"/>
-            <a:ext cx="2775672" cy="2205806"/>
-          </a:xfrm>
-          <a:prstGeom prst="rect">
-            <a:avLst/>
-          </a:prstGeom>
-          <a:ln>
-            <a:solidFill>
-              <a:srgbClr val="FC2E8B"/>
-            </a:solidFill>
-          </a:ln>
-        </p:spPr>
-      </p:pic>
     </p:spTree>
   </p:cSld>
   <p:clrMapOvr>
@@ -5362,8 +5333,8 @@
         </p:nvSpPr>
         <p:spPr>
           <a:xfrm>
-            <a:off x="457200" y="1744217"/>
-            <a:ext cx="8229600" cy="4133055"/>
+            <a:off x="438904" y="1652935"/>
+            <a:ext cx="5915000" cy="4133055"/>
           </a:xfrm>
         </p:spPr>
         <p:txBody>
@@ -5487,7 +5458,7 @@
         </p:nvSpPr>
         <p:spPr>
           <a:xfrm>
-            <a:off x="2411760" y="2492896"/>
+            <a:off x="2411760" y="2708920"/>
             <a:ext cx="3390672" cy="400110"/>
           </a:xfrm>
           <a:prstGeom prst="rect">
@@ -5594,7 +5565,7 @@
         </p:blipFill>
         <p:spPr>
           <a:xfrm>
-            <a:off x="5796136" y="3789040"/>
+            <a:off x="6575664" y="3573016"/>
             <a:ext cx="1794444" cy="1794444"/>
           </a:xfrm>
           <a:prstGeom prst="rect">

</xml_diff>

<commit_message>
Recursos para la ponencia
</commit_message>
<xml_diff>
--- a/Angelica Landazabal - PyConCo2020.pptx
+++ b/Angelica Landazabal - PyConCo2020.pptx
@@ -334,7 +334,7 @@
             <a:fld id="{5858ED9B-BE88-4148-BE32-6CCB0FE6727E}" type="datetimeFigureOut">
               <a:rPr lang="da-DK" smtClean="0"/>
               <a:pPr/>
-              <a:t>16-06-2020</a:t>
+              <a:t>17-06-2020</a:t>
             </a:fld>
             <a:endParaRPr lang="da-DK"/>
           </a:p>
@@ -504,7 +504,7 @@
             <a:fld id="{5858ED9B-BE88-4148-BE32-6CCB0FE6727E}" type="datetimeFigureOut">
               <a:rPr lang="da-DK" smtClean="0"/>
               <a:pPr/>
-              <a:t>16-06-2020</a:t>
+              <a:t>17-06-2020</a:t>
             </a:fld>
             <a:endParaRPr lang="da-DK"/>
           </a:p>
@@ -684,7 +684,7 @@
             <a:fld id="{5858ED9B-BE88-4148-BE32-6CCB0FE6727E}" type="datetimeFigureOut">
               <a:rPr lang="da-DK" smtClean="0"/>
               <a:pPr/>
-              <a:t>16-06-2020</a:t>
+              <a:t>17-06-2020</a:t>
             </a:fld>
             <a:endParaRPr lang="da-DK"/>
           </a:p>
@@ -854,7 +854,7 @@
             <a:fld id="{5858ED9B-BE88-4148-BE32-6CCB0FE6727E}" type="datetimeFigureOut">
               <a:rPr lang="da-DK" smtClean="0"/>
               <a:pPr/>
-              <a:t>16-06-2020</a:t>
+              <a:t>17-06-2020</a:t>
             </a:fld>
             <a:endParaRPr lang="da-DK"/>
           </a:p>
@@ -1101,7 +1101,7 @@
             <a:fld id="{5858ED9B-BE88-4148-BE32-6CCB0FE6727E}" type="datetimeFigureOut">
               <a:rPr lang="da-DK" smtClean="0"/>
               <a:pPr/>
-              <a:t>16-06-2020</a:t>
+              <a:t>17-06-2020</a:t>
             </a:fld>
             <a:endParaRPr lang="da-DK"/>
           </a:p>
@@ -1388,7 +1388,7 @@
             <a:fld id="{5858ED9B-BE88-4148-BE32-6CCB0FE6727E}" type="datetimeFigureOut">
               <a:rPr lang="da-DK" smtClean="0"/>
               <a:pPr/>
-              <a:t>16-06-2020</a:t>
+              <a:t>17-06-2020</a:t>
             </a:fld>
             <a:endParaRPr lang="da-DK"/>
           </a:p>
@@ -1809,7 +1809,7 @@
             <a:fld id="{5858ED9B-BE88-4148-BE32-6CCB0FE6727E}" type="datetimeFigureOut">
               <a:rPr lang="da-DK" smtClean="0"/>
               <a:pPr/>
-              <a:t>16-06-2020</a:t>
+              <a:t>17-06-2020</a:t>
             </a:fld>
             <a:endParaRPr lang="da-DK"/>
           </a:p>
@@ -1928,7 +1928,7 @@
             <a:fld id="{5858ED9B-BE88-4148-BE32-6CCB0FE6727E}" type="datetimeFigureOut">
               <a:rPr lang="da-DK" smtClean="0"/>
               <a:pPr/>
-              <a:t>16-06-2020</a:t>
+              <a:t>17-06-2020</a:t>
             </a:fld>
             <a:endParaRPr lang="da-DK"/>
           </a:p>
@@ -2025,7 +2025,7 @@
             <a:fld id="{5858ED9B-BE88-4148-BE32-6CCB0FE6727E}" type="datetimeFigureOut">
               <a:rPr lang="da-DK" smtClean="0"/>
               <a:pPr/>
-              <a:t>16-06-2020</a:t>
+              <a:t>17-06-2020</a:t>
             </a:fld>
             <a:endParaRPr lang="da-DK"/>
           </a:p>
@@ -2302,7 +2302,7 @@
             <a:fld id="{5858ED9B-BE88-4148-BE32-6CCB0FE6727E}" type="datetimeFigureOut">
               <a:rPr lang="da-DK" smtClean="0"/>
               <a:pPr/>
-              <a:t>16-06-2020</a:t>
+              <a:t>17-06-2020</a:t>
             </a:fld>
             <a:endParaRPr lang="da-DK"/>
           </a:p>
@@ -2556,7 +2556,7 @@
             <a:fld id="{5858ED9B-BE88-4148-BE32-6CCB0FE6727E}" type="datetimeFigureOut">
               <a:rPr lang="da-DK" smtClean="0"/>
               <a:pPr/>
-              <a:t>16-06-2020</a:t>
+              <a:t>17-06-2020</a:t>
             </a:fld>
             <a:endParaRPr lang="da-DK"/>
           </a:p>
@@ -2769,7 +2769,7 @@
             <a:fld id="{5858ED9B-BE88-4148-BE32-6CCB0FE6727E}" type="datetimeFigureOut">
               <a:rPr lang="da-DK" smtClean="0"/>
               <a:pPr/>
-              <a:t>16-06-2020</a:t>
+              <a:t>17-06-2020</a:t>
             </a:fld>
             <a:endParaRPr lang="da-DK"/>
           </a:p>
@@ -3216,7 +3216,7 @@
                 </a:solidFill>
                 <a:latin typeface="Ubuntu Medium" panose="020B0604030602030204" pitchFamily="34" charset="0"/>
               </a:rPr>
-              <a:t>#PyConCo2020</a:t>
+              <a:t>#PythonPereira</a:t>
             </a:r>
             <a:endParaRPr lang="da-DK" sz="7200" dirty="0">
               <a:solidFill>

</xml_diff>